<commit_message>
Testbeispiele - erste Idee
</commit_message>
<xml_diff>
--- a/material/RISIKO - Testbeispiele.pptx
+++ b/material/RISIKO - Testbeispiele.pptx
@@ -5335,10 +5335,10 @@
       </p:sp>
       <p:pic>
         <p:nvPicPr>
-          <p:cNvPr id="8" name="Grafik 7">
+          <p:cNvPr id="9" name="Grafik 8">
             <a:extLst>
               <a:ext uri="{FF2B5EF4-FFF2-40B4-BE49-F238E27FC236}">
-                <a16:creationId xmlns:a16="http://schemas.microsoft.com/office/drawing/2014/main" id="{04028DA5-F315-4F47-A89C-15D044950E1F}"/>
+                <a16:creationId xmlns:a16="http://schemas.microsoft.com/office/drawing/2014/main" id="{9A348A80-38C8-4B4F-9069-D80432437C20}"/>
               </a:ext>
             </a:extLst>
           </p:cNvPr>
@@ -5355,8 +5355,8 @@
         </p:blipFill>
         <p:spPr>
           <a:xfrm>
-            <a:off x="6457950" y="3770908"/>
-            <a:ext cx="2048107" cy="1234245"/>
+            <a:off x="6452354" y="3717446"/>
+            <a:ext cx="2053703" cy="1234245"/>
           </a:xfrm>
           <a:prstGeom prst="rect">
             <a:avLst/>

</xml_diff>